<commit_message>
Updated calling trees PPTX
</commit_message>
<xml_diff>
--- a/Data Management and Access Calling Trees.pptx
+++ b/Data Management and Access Calling Trees.pptx
@@ -6,9 +6,6 @@
   </p:sldMasterIdLst>
   <p:sldIdLst>
     <p:sldId id="257" r:id="rId2"/>
-    <p:sldId id="259" r:id="rId3"/>
-    <p:sldId id="260" r:id="rId4"/>
-    <p:sldId id="262" r:id="rId5"/>
   </p:sldIdLst>
   <p:sldSz cx="6858000" cy="9144000" type="screen4x3"/>
   <p:notesSz cx="6858000" cy="9144000"/>
@@ -4278,1776 +4275,6 @@
 </p:sld>
 </file>
 
-<file path=ppt/slides/slide2.xml><?xml version="1.0" encoding="utf-8"?>
-<p:sld xmlns:a="http://schemas.openxmlformats.org/drawingml/2006/main" xmlns:r="http://schemas.openxmlformats.org/officeDocument/2006/relationships" xmlns:p="http://schemas.openxmlformats.org/presentationml/2006/main">
-  <p:cSld>
-    <p:spTree>
-      <p:nvGrpSpPr>
-        <p:cNvPr id="1" name="">
-          <a:extLst>
-            <a:ext uri="{FF2B5EF4-FFF2-40B4-BE49-F238E27FC236}">
-              <a16:creationId xmlns:a16="http://schemas.microsoft.com/office/drawing/2014/main" id="{7C6E8AF2-7493-EB83-D4E1-29E491C21E36}"/>
-            </a:ext>
-          </a:extLst>
-        </p:cNvPr>
-        <p:cNvGrpSpPr/>
-        <p:nvPr/>
-      </p:nvGrpSpPr>
-      <p:grpSpPr>
-        <a:xfrm>
-          <a:off x="0" y="0"/>
-          <a:ext cx="0" cy="0"/>
-          <a:chOff x="0" y="0"/>
-          <a:chExt cx="0" cy="0"/>
-        </a:xfrm>
-      </p:grpSpPr>
-      <p:cxnSp>
-        <p:nvCxnSpPr>
-          <p:cNvPr id="45" name="Connector: Elbow 44">
-            <a:extLst>
-              <a:ext uri="{FF2B5EF4-FFF2-40B4-BE49-F238E27FC236}">
-                <a16:creationId xmlns:a16="http://schemas.microsoft.com/office/drawing/2014/main" id="{ECE876B4-5BA6-9329-3C90-4EA09E7AB351}"/>
-              </a:ext>
-            </a:extLst>
-          </p:cNvPr>
-          <p:cNvCxnSpPr>
-            <a:cxnSpLocks/>
-            <a:stCxn id="4" idx="2"/>
-            <a:endCxn id="6" idx="0"/>
-          </p:cNvCxnSpPr>
-          <p:nvPr/>
-        </p:nvCxnSpPr>
-        <p:spPr>
-          <a:xfrm rot="5400000">
-            <a:off x="1512598" y="1744248"/>
-            <a:ext cx="904648" cy="2430984"/>
-          </a:xfrm>
-          <a:prstGeom prst="bentConnector3">
-            <a:avLst>
-              <a:gd name="adj1" fmla="val 50000"/>
-            </a:avLst>
-          </a:prstGeom>
-          <a:ln w="63500">
-            <a:solidFill>
-              <a:schemeClr val="accent5">
-                <a:lumMod val="40000"/>
-                <a:lumOff val="60000"/>
-              </a:schemeClr>
-            </a:solidFill>
-          </a:ln>
-        </p:spPr>
-        <p:style>
-          <a:lnRef idx="3">
-            <a:schemeClr val="dk1"/>
-          </a:lnRef>
-          <a:fillRef idx="0">
-            <a:schemeClr val="dk1"/>
-          </a:fillRef>
-          <a:effectRef idx="2">
-            <a:schemeClr val="dk1"/>
-          </a:effectRef>
-          <a:fontRef idx="minor">
-            <a:schemeClr val="tx1"/>
-          </a:fontRef>
-        </p:style>
-      </p:cxnSp>
-      <p:sp>
-        <p:nvSpPr>
-          <p:cNvPr id="4" name="Rectangle: Rounded Corners 3">
-            <a:extLst>
-              <a:ext uri="{FF2B5EF4-FFF2-40B4-BE49-F238E27FC236}">
-                <a16:creationId xmlns:a16="http://schemas.microsoft.com/office/drawing/2014/main" id="{85899705-0BF2-A7E8-3554-64DF2F638B79}"/>
-              </a:ext>
-            </a:extLst>
-          </p:cNvPr>
-          <p:cNvSpPr/>
-          <p:nvPr/>
-        </p:nvSpPr>
-        <p:spPr>
-          <a:xfrm>
-            <a:off x="2493881" y="2170532"/>
-            <a:ext cx="1373066" cy="336884"/>
-          </a:xfrm>
-          <a:prstGeom prst="roundRect">
-            <a:avLst/>
-          </a:prstGeom>
-          <a:ln w="28575"/>
-        </p:spPr>
-        <p:style>
-          <a:lnRef idx="2">
-            <a:schemeClr val="dk1"/>
-          </a:lnRef>
-          <a:fillRef idx="1">
-            <a:schemeClr val="lt1"/>
-          </a:fillRef>
-          <a:effectRef idx="0">
-            <a:schemeClr val="dk1"/>
-          </a:effectRef>
-          <a:fontRef idx="minor">
-            <a:schemeClr val="dk1"/>
-          </a:fontRef>
-        </p:style>
-        <p:txBody>
-          <a:bodyPr lIns="0" tIns="0" rIns="0" bIns="0" rtlCol="0" anchor="ctr"/>
-          <a:lstStyle/>
-          <a:p>
-            <a:pPr algn="ctr"/>
-            <a:r>
-              <a:rPr lang="en-US" sz="1400" dirty="0"/>
-              <a:t>L3_Jup_Map_Plot</a:t>
-            </a:r>
-          </a:p>
-        </p:txBody>
-      </p:sp>
-      <p:sp>
-        <p:nvSpPr>
-          <p:cNvPr id="6" name="Rectangle: Rounded Corners 5">
-            <a:extLst>
-              <a:ext uri="{FF2B5EF4-FFF2-40B4-BE49-F238E27FC236}">
-                <a16:creationId xmlns:a16="http://schemas.microsoft.com/office/drawing/2014/main" id="{81BC36D6-23C8-71FC-FE02-DC1201F4FB26}"/>
-              </a:ext>
-            </a:extLst>
-          </p:cNvPr>
-          <p:cNvSpPr/>
-          <p:nvPr/>
-        </p:nvSpPr>
-        <p:spPr>
-          <a:xfrm>
-            <a:off x="203998" y="3412064"/>
-            <a:ext cx="1090864" cy="336884"/>
-          </a:xfrm>
-          <a:prstGeom prst="roundRect">
-            <a:avLst/>
-          </a:prstGeom>
-          <a:ln w="28575"/>
-        </p:spPr>
-        <p:style>
-          <a:lnRef idx="2">
-            <a:schemeClr val="dk1"/>
-          </a:lnRef>
-          <a:fillRef idx="1">
-            <a:schemeClr val="lt1"/>
-          </a:fillRef>
-          <a:effectRef idx="0">
-            <a:schemeClr val="dk1"/>
-          </a:effectRef>
-          <a:fontRef idx="minor">
-            <a:schemeClr val="dk1"/>
-          </a:fontRef>
-        </p:style>
-        <p:txBody>
-          <a:bodyPr lIns="0" tIns="0" rIns="0" bIns="0" rtlCol="0" anchor="ctr"/>
-          <a:lstStyle/>
-          <a:p>
-            <a:pPr algn="ctr"/>
-            <a:r>
-              <a:rPr lang="en-US" sz="1400" dirty="0" err="1"/>
-              <a:t>make_patch</a:t>
-            </a:r>
-            <a:endParaRPr lang="en-US" sz="1400" dirty="0"/>
-          </a:p>
-        </p:txBody>
-      </p:sp>
-      <p:sp>
-        <p:nvSpPr>
-          <p:cNvPr id="13" name="Rectangle: Rounded Corners 12">
-            <a:extLst>
-              <a:ext uri="{FF2B5EF4-FFF2-40B4-BE49-F238E27FC236}">
-                <a16:creationId xmlns:a16="http://schemas.microsoft.com/office/drawing/2014/main" id="{11088B1F-F83F-7618-1F23-E8A6992A77DE}"/>
-              </a:ext>
-            </a:extLst>
-          </p:cNvPr>
-          <p:cNvSpPr/>
-          <p:nvPr/>
-        </p:nvSpPr>
-        <p:spPr>
-          <a:xfrm>
-            <a:off x="1481805" y="3416175"/>
-            <a:ext cx="1636294" cy="336884"/>
-          </a:xfrm>
-          <a:prstGeom prst="roundRect">
-            <a:avLst/>
-          </a:prstGeom>
-          <a:ln w="28575"/>
-        </p:spPr>
-        <p:style>
-          <a:lnRef idx="2">
-            <a:schemeClr val="dk1"/>
-          </a:lnRef>
-          <a:fillRef idx="1">
-            <a:schemeClr val="lt1"/>
-          </a:fillRef>
-          <a:effectRef idx="0">
-            <a:schemeClr val="dk1"/>
-          </a:effectRef>
-          <a:fontRef idx="minor">
-            <a:schemeClr val="dk1"/>
-          </a:fontRef>
-        </p:style>
-        <p:txBody>
-          <a:bodyPr lIns="0" tIns="0" rIns="0" bIns="0" rtlCol="0" anchor="ctr"/>
-          <a:lstStyle/>
-          <a:p>
-            <a:pPr algn="ctr"/>
-            <a:r>
-              <a:rPr lang="en-US" sz="1400" dirty="0"/>
-              <a:t>read_fits_map_L2_L3</a:t>
-            </a:r>
-          </a:p>
-        </p:txBody>
-      </p:sp>
-      <p:sp>
-        <p:nvSpPr>
-          <p:cNvPr id="20" name="Rectangle: Rounded Corners 19">
-            <a:extLst>
-              <a:ext uri="{FF2B5EF4-FFF2-40B4-BE49-F238E27FC236}">
-                <a16:creationId xmlns:a16="http://schemas.microsoft.com/office/drawing/2014/main" id="{14FED5FA-DABF-B93D-3671-8FDF8B924013}"/>
-              </a:ext>
-            </a:extLst>
-          </p:cNvPr>
-          <p:cNvSpPr/>
-          <p:nvPr/>
-        </p:nvSpPr>
-        <p:spPr>
-          <a:xfrm>
-            <a:off x="3305042" y="3412065"/>
-            <a:ext cx="1636294" cy="336884"/>
-          </a:xfrm>
-          <a:prstGeom prst="roundRect">
-            <a:avLst/>
-          </a:prstGeom>
-          <a:ln w="28575"/>
-        </p:spPr>
-        <p:style>
-          <a:lnRef idx="2">
-            <a:schemeClr val="dk1"/>
-          </a:lnRef>
-          <a:fillRef idx="1">
-            <a:schemeClr val="lt1"/>
-          </a:fillRef>
-          <a:effectRef idx="0">
-            <a:schemeClr val="dk1"/>
-          </a:effectRef>
-          <a:fontRef idx="minor">
-            <a:schemeClr val="dk1"/>
-          </a:fontRef>
-        </p:style>
-        <p:txBody>
-          <a:bodyPr lIns="0" tIns="0" rIns="0" bIns="0" rtlCol="0" anchor="ctr"/>
-          <a:lstStyle/>
-          <a:p>
-            <a:pPr algn="ctr"/>
-            <a:r>
-              <a:rPr lang="en-US" sz="1400" dirty="0" err="1"/>
-              <a:t>map_and_context</a:t>
-            </a:r>
-            <a:endParaRPr lang="en-US" sz="1400" dirty="0"/>
-          </a:p>
-        </p:txBody>
-      </p:sp>
-      <p:sp>
-        <p:nvSpPr>
-          <p:cNvPr id="21" name="Rectangle: Rounded Corners 20">
-            <a:extLst>
-              <a:ext uri="{FF2B5EF4-FFF2-40B4-BE49-F238E27FC236}">
-                <a16:creationId xmlns:a16="http://schemas.microsoft.com/office/drawing/2014/main" id="{F5408430-6FFB-51FE-DD6C-CB199ABE508A}"/>
-              </a:ext>
-            </a:extLst>
-          </p:cNvPr>
-          <p:cNvSpPr/>
-          <p:nvPr/>
-        </p:nvSpPr>
-        <p:spPr>
-          <a:xfrm>
-            <a:off x="5065964" y="3412065"/>
-            <a:ext cx="1636294" cy="336884"/>
-          </a:xfrm>
-          <a:prstGeom prst="roundRect">
-            <a:avLst/>
-          </a:prstGeom>
-          <a:ln w="28575"/>
-        </p:spPr>
-        <p:style>
-          <a:lnRef idx="2">
-            <a:schemeClr val="dk1"/>
-          </a:lnRef>
-          <a:fillRef idx="1">
-            <a:schemeClr val="lt1"/>
-          </a:fillRef>
-          <a:effectRef idx="0">
-            <a:schemeClr val="dk1"/>
-          </a:effectRef>
-          <a:fontRef idx="minor">
-            <a:schemeClr val="dk1"/>
-          </a:fontRef>
-        </p:style>
-        <p:txBody>
-          <a:bodyPr lIns="0" tIns="0" rIns="0" bIns="0" rtlCol="0" anchor="ctr"/>
-          <a:lstStyle/>
-          <a:p>
-            <a:pPr algn="ctr"/>
-            <a:r>
-              <a:rPr lang="en-US" sz="1400" dirty="0" err="1"/>
-              <a:t>map_and_scatter</a:t>
-            </a:r>
-            <a:endParaRPr lang="en-US" sz="1400" dirty="0"/>
-          </a:p>
-        </p:txBody>
-      </p:sp>
-      <p:cxnSp>
-        <p:nvCxnSpPr>
-          <p:cNvPr id="22" name="Connector: Elbow 21">
-            <a:extLst>
-              <a:ext uri="{FF2B5EF4-FFF2-40B4-BE49-F238E27FC236}">
-                <a16:creationId xmlns:a16="http://schemas.microsoft.com/office/drawing/2014/main" id="{7753BABF-6F0E-B9E2-7839-F366A3AAEB82}"/>
-              </a:ext>
-            </a:extLst>
-          </p:cNvPr>
-          <p:cNvCxnSpPr>
-            <a:cxnSpLocks/>
-            <a:stCxn id="4" idx="2"/>
-            <a:endCxn id="20" idx="0"/>
-          </p:cNvCxnSpPr>
-          <p:nvPr/>
-        </p:nvCxnSpPr>
-        <p:spPr>
-          <a:xfrm rot="16200000" flipH="1">
-            <a:off x="3199477" y="2488352"/>
-            <a:ext cx="904649" cy="942775"/>
-          </a:xfrm>
-          <a:prstGeom prst="bentConnector3">
-            <a:avLst/>
-          </a:prstGeom>
-          <a:ln w="63500">
-            <a:solidFill>
-              <a:schemeClr val="accent5">
-                <a:lumMod val="40000"/>
-                <a:lumOff val="60000"/>
-              </a:schemeClr>
-            </a:solidFill>
-          </a:ln>
-        </p:spPr>
-        <p:style>
-          <a:lnRef idx="3">
-            <a:schemeClr val="dk1"/>
-          </a:lnRef>
-          <a:fillRef idx="0">
-            <a:schemeClr val="dk1"/>
-          </a:fillRef>
-          <a:effectRef idx="2">
-            <a:schemeClr val="dk1"/>
-          </a:effectRef>
-          <a:fontRef idx="minor">
-            <a:schemeClr val="tx1"/>
-          </a:fontRef>
-        </p:style>
-      </p:cxnSp>
-      <p:cxnSp>
-        <p:nvCxnSpPr>
-          <p:cNvPr id="25" name="Connector: Elbow 24">
-            <a:extLst>
-              <a:ext uri="{FF2B5EF4-FFF2-40B4-BE49-F238E27FC236}">
-                <a16:creationId xmlns:a16="http://schemas.microsoft.com/office/drawing/2014/main" id="{7928408B-47E6-74CE-758F-2FD2320162A2}"/>
-              </a:ext>
-            </a:extLst>
-          </p:cNvPr>
-          <p:cNvCxnSpPr>
-            <a:cxnSpLocks/>
-            <a:stCxn id="4" idx="2"/>
-            <a:endCxn id="21" idx="0"/>
-          </p:cNvCxnSpPr>
-          <p:nvPr/>
-        </p:nvCxnSpPr>
-        <p:spPr>
-          <a:xfrm rot="16200000" flipH="1">
-            <a:off x="4079938" y="1607891"/>
-            <a:ext cx="904649" cy="2703697"/>
-          </a:xfrm>
-          <a:prstGeom prst="bentConnector3">
-            <a:avLst>
-              <a:gd name="adj1" fmla="val 50000"/>
-            </a:avLst>
-          </a:prstGeom>
-          <a:ln w="63500">
-            <a:solidFill>
-              <a:schemeClr val="accent5">
-                <a:lumMod val="40000"/>
-                <a:lumOff val="60000"/>
-              </a:schemeClr>
-            </a:solidFill>
-          </a:ln>
-        </p:spPr>
-        <p:style>
-          <a:lnRef idx="3">
-            <a:schemeClr val="dk1"/>
-          </a:lnRef>
-          <a:fillRef idx="0">
-            <a:schemeClr val="dk1"/>
-          </a:fillRef>
-          <a:effectRef idx="2">
-            <a:schemeClr val="dk1"/>
-          </a:effectRef>
-          <a:fontRef idx="minor">
-            <a:schemeClr val="tx1"/>
-          </a:fontRef>
-        </p:style>
-      </p:cxnSp>
-      <p:cxnSp>
-        <p:nvCxnSpPr>
-          <p:cNvPr id="36" name="Connector: Elbow 35">
-            <a:extLst>
-              <a:ext uri="{FF2B5EF4-FFF2-40B4-BE49-F238E27FC236}">
-                <a16:creationId xmlns:a16="http://schemas.microsoft.com/office/drawing/2014/main" id="{443BB493-6BA7-4AC9-7F22-058A5BC0C230}"/>
-              </a:ext>
-            </a:extLst>
-          </p:cNvPr>
-          <p:cNvCxnSpPr>
-            <a:cxnSpLocks/>
-            <a:stCxn id="4" idx="2"/>
-            <a:endCxn id="13" idx="0"/>
-          </p:cNvCxnSpPr>
-          <p:nvPr/>
-        </p:nvCxnSpPr>
-        <p:spPr>
-          <a:xfrm rot="5400000">
-            <a:off x="2285804" y="2521564"/>
-            <a:ext cx="908759" cy="880462"/>
-          </a:xfrm>
-          <a:prstGeom prst="bentConnector3">
-            <a:avLst>
-              <a:gd name="adj1" fmla="val 50000"/>
-            </a:avLst>
-          </a:prstGeom>
-          <a:ln w="63500">
-            <a:solidFill>
-              <a:schemeClr val="accent5">
-                <a:lumMod val="40000"/>
-                <a:lumOff val="60000"/>
-              </a:schemeClr>
-            </a:solidFill>
-          </a:ln>
-        </p:spPr>
-        <p:style>
-          <a:lnRef idx="3">
-            <a:schemeClr val="dk1"/>
-          </a:lnRef>
-          <a:fillRef idx="0">
-            <a:schemeClr val="dk1"/>
-          </a:fillRef>
-          <a:effectRef idx="2">
-            <a:schemeClr val="dk1"/>
-          </a:effectRef>
-          <a:fontRef idx="minor">
-            <a:schemeClr val="tx1"/>
-          </a:fontRef>
-        </p:style>
-      </p:cxnSp>
-    </p:spTree>
-    <p:extLst>
-      <p:ext uri="{BB962C8B-B14F-4D97-AF65-F5344CB8AC3E}">
-        <p14:creationId xmlns:p14="http://schemas.microsoft.com/office/powerpoint/2010/main" val="3721663089"/>
-      </p:ext>
-    </p:extLst>
-  </p:cSld>
-  <p:clrMapOvr>
-    <a:masterClrMapping/>
-  </p:clrMapOvr>
-</p:sld>
-</file>
-
-<file path=ppt/slides/slide3.xml><?xml version="1.0" encoding="utf-8"?>
-<p:sld xmlns:a="http://schemas.openxmlformats.org/drawingml/2006/main" xmlns:r="http://schemas.openxmlformats.org/officeDocument/2006/relationships" xmlns:p="http://schemas.openxmlformats.org/presentationml/2006/main">
-  <p:cSld>
-    <p:spTree>
-      <p:nvGrpSpPr>
-        <p:cNvPr id="1" name="">
-          <a:extLst>
-            <a:ext uri="{FF2B5EF4-FFF2-40B4-BE49-F238E27FC236}">
-              <a16:creationId xmlns:a16="http://schemas.microsoft.com/office/drawing/2014/main" id="{2329BCD9-04A0-2084-B05D-8CE4409A51B0}"/>
-            </a:ext>
-          </a:extLst>
-        </p:cNvPr>
-        <p:cNvGrpSpPr/>
-        <p:nvPr/>
-      </p:nvGrpSpPr>
-      <p:grpSpPr>
-        <a:xfrm>
-          <a:off x="0" y="0"/>
-          <a:ext cx="0" cy="0"/>
-          <a:chOff x="0" y="0"/>
-          <a:chExt cx="0" cy="0"/>
-        </a:xfrm>
-      </p:grpSpPr>
-      <p:sp>
-        <p:nvSpPr>
-          <p:cNvPr id="6" name="Rectangle: Rounded Corners 5">
-            <a:extLst>
-              <a:ext uri="{FF2B5EF4-FFF2-40B4-BE49-F238E27FC236}">
-                <a16:creationId xmlns:a16="http://schemas.microsoft.com/office/drawing/2014/main" id="{E0977E15-9EC1-7F14-0EBC-1CCF21F027DE}"/>
-              </a:ext>
-            </a:extLst>
-          </p:cNvPr>
-          <p:cNvSpPr/>
-          <p:nvPr/>
-        </p:nvSpPr>
-        <p:spPr>
-          <a:xfrm>
-            <a:off x="253966" y="4603567"/>
-            <a:ext cx="1090864" cy="336884"/>
-          </a:xfrm>
-          <a:prstGeom prst="roundRect">
-            <a:avLst/>
-          </a:prstGeom>
-          <a:ln w="28575"/>
-        </p:spPr>
-        <p:style>
-          <a:lnRef idx="2">
-            <a:schemeClr val="dk1"/>
-          </a:lnRef>
-          <a:fillRef idx="1">
-            <a:schemeClr val="lt1"/>
-          </a:fillRef>
-          <a:effectRef idx="0">
-            <a:schemeClr val="dk1"/>
-          </a:effectRef>
-          <a:fontRef idx="minor">
-            <a:schemeClr val="dk1"/>
-          </a:fontRef>
-        </p:style>
-        <p:txBody>
-          <a:bodyPr lIns="0" tIns="0" rIns="0" bIns="0" rtlCol="0" anchor="ctr"/>
-          <a:lstStyle/>
-          <a:p>
-            <a:pPr algn="ctr"/>
-            <a:r>
-              <a:rPr lang="en-US" sz="1200" dirty="0" err="1"/>
-              <a:t>make_patch</a:t>
-            </a:r>
-            <a:endParaRPr lang="en-US" sz="1200" dirty="0"/>
-          </a:p>
-        </p:txBody>
-      </p:sp>
-      <p:sp>
-        <p:nvSpPr>
-          <p:cNvPr id="7" name="Rectangle: Rounded Corners 6">
-            <a:extLst>
-              <a:ext uri="{FF2B5EF4-FFF2-40B4-BE49-F238E27FC236}">
-                <a16:creationId xmlns:a16="http://schemas.microsoft.com/office/drawing/2014/main" id="{82E82D27-6634-99FC-0675-0D62C664317F}"/>
-              </a:ext>
-            </a:extLst>
-          </p:cNvPr>
-          <p:cNvSpPr/>
-          <p:nvPr/>
-        </p:nvSpPr>
-        <p:spPr>
-          <a:xfrm>
-            <a:off x="2772041" y="4603567"/>
-            <a:ext cx="2078728" cy="336884"/>
-          </a:xfrm>
-          <a:prstGeom prst="roundRect">
-            <a:avLst/>
-          </a:prstGeom>
-          <a:ln w="28575"/>
-        </p:spPr>
-        <p:style>
-          <a:lnRef idx="2">
-            <a:schemeClr val="dk1"/>
-          </a:lnRef>
-          <a:fillRef idx="1">
-            <a:schemeClr val="lt1"/>
-          </a:fillRef>
-          <a:effectRef idx="0">
-            <a:schemeClr val="dk1"/>
-          </a:effectRef>
-          <a:fontRef idx="minor">
-            <a:schemeClr val="dk1"/>
-          </a:fontRef>
-        </p:style>
-        <p:txBody>
-          <a:bodyPr lIns="0" tIns="0" rIns="0" bIns="0" rtlCol="0" anchor="ctr"/>
-          <a:lstStyle/>
-          <a:p>
-            <a:pPr algn="ctr"/>
-            <a:r>
-              <a:rPr lang="en-US" sz="1200" dirty="0" err="1"/>
-              <a:t>plot_contours_on_patch</a:t>
-            </a:r>
-            <a:endParaRPr lang="en-US" sz="1200" dirty="0"/>
-          </a:p>
-        </p:txBody>
-      </p:sp>
-      <p:sp>
-        <p:nvSpPr>
-          <p:cNvPr id="11" name="Rectangle: Rounded Corners 10">
-            <a:extLst>
-              <a:ext uri="{FF2B5EF4-FFF2-40B4-BE49-F238E27FC236}">
-                <a16:creationId xmlns:a16="http://schemas.microsoft.com/office/drawing/2014/main" id="{3CD0B181-6BF1-D83B-0B8A-D39E291E7CB7}"/>
-              </a:ext>
-            </a:extLst>
-          </p:cNvPr>
-          <p:cNvSpPr/>
-          <p:nvPr/>
-        </p:nvSpPr>
-        <p:spPr>
-          <a:xfrm>
-            <a:off x="1706075" y="4603567"/>
-            <a:ext cx="913802" cy="336884"/>
-          </a:xfrm>
-          <a:prstGeom prst="roundRect">
-            <a:avLst/>
-          </a:prstGeom>
-          <a:ln w="28575"/>
-        </p:spPr>
-        <p:style>
-          <a:lnRef idx="2">
-            <a:schemeClr val="dk1"/>
-          </a:lnRef>
-          <a:fillRef idx="1">
-            <a:schemeClr val="lt1"/>
-          </a:fillRef>
-          <a:effectRef idx="0">
-            <a:schemeClr val="dk1"/>
-          </a:effectRef>
-          <a:fontRef idx="minor">
-            <a:schemeClr val="dk1"/>
-          </a:fontRef>
-        </p:style>
-        <p:txBody>
-          <a:bodyPr lIns="0" tIns="0" rIns="0" bIns="0" rtlCol="0" anchor="ctr"/>
-          <a:lstStyle/>
-          <a:p>
-            <a:pPr algn="ctr"/>
-            <a:r>
-              <a:rPr lang="en-US" sz="1200" dirty="0" err="1"/>
-              <a:t>plot_patch</a:t>
-            </a:r>
-            <a:endParaRPr lang="en-US" sz="1200" dirty="0"/>
-          </a:p>
-        </p:txBody>
-      </p:sp>
-      <p:sp>
-        <p:nvSpPr>
-          <p:cNvPr id="12" name="Rectangle: Rounded Corners 11">
-            <a:extLst>
-              <a:ext uri="{FF2B5EF4-FFF2-40B4-BE49-F238E27FC236}">
-                <a16:creationId xmlns:a16="http://schemas.microsoft.com/office/drawing/2014/main" id="{5F19FED2-8B9A-EDE2-E568-6866364288EE}"/>
-              </a:ext>
-            </a:extLst>
-          </p:cNvPr>
-          <p:cNvSpPr/>
-          <p:nvPr/>
-        </p:nvSpPr>
-        <p:spPr>
-          <a:xfrm>
-            <a:off x="5097528" y="4603567"/>
-            <a:ext cx="1407732" cy="336884"/>
-          </a:xfrm>
-          <a:prstGeom prst="roundRect">
-            <a:avLst/>
-          </a:prstGeom>
-          <a:ln w="28575"/>
-        </p:spPr>
-        <p:style>
-          <a:lnRef idx="2">
-            <a:schemeClr val="dk1"/>
-          </a:lnRef>
-          <a:fillRef idx="1">
-            <a:schemeClr val="lt1"/>
-          </a:fillRef>
-          <a:effectRef idx="0">
-            <a:schemeClr val="dk1"/>
-          </a:effectRef>
-          <a:fontRef idx="minor">
-            <a:schemeClr val="dk1"/>
-          </a:fontRef>
-        </p:style>
-        <p:txBody>
-          <a:bodyPr lIns="0" tIns="0" rIns="0" bIns="0" rtlCol="0" anchor="ctr"/>
-          <a:lstStyle/>
-          <a:p>
-            <a:pPr algn="ctr"/>
-            <a:r>
-              <a:rPr lang="en-US" sz="1200" dirty="0" err="1"/>
-              <a:t>make_patch_RGB</a:t>
-            </a:r>
-            <a:endParaRPr lang="en-US" sz="1200" dirty="0"/>
-          </a:p>
-        </p:txBody>
-      </p:sp>
-      <p:sp>
-        <p:nvSpPr>
-          <p:cNvPr id="20" name="Rectangle: Rounded Corners 19">
-            <a:extLst>
-              <a:ext uri="{FF2B5EF4-FFF2-40B4-BE49-F238E27FC236}">
-                <a16:creationId xmlns:a16="http://schemas.microsoft.com/office/drawing/2014/main" id="{492565F1-45CC-3EB2-8887-A32AFA9AE92C}"/>
-              </a:ext>
-            </a:extLst>
-          </p:cNvPr>
-          <p:cNvSpPr/>
-          <p:nvPr/>
-        </p:nvSpPr>
-        <p:spPr>
-          <a:xfrm>
-            <a:off x="2351205" y="3412065"/>
-            <a:ext cx="1636294" cy="336884"/>
-          </a:xfrm>
-          <a:prstGeom prst="roundRect">
-            <a:avLst/>
-          </a:prstGeom>
-          <a:ln w="28575"/>
-        </p:spPr>
-        <p:style>
-          <a:lnRef idx="2">
-            <a:schemeClr val="dk1"/>
-          </a:lnRef>
-          <a:fillRef idx="1">
-            <a:schemeClr val="lt1"/>
-          </a:fillRef>
-          <a:effectRef idx="0">
-            <a:schemeClr val="dk1"/>
-          </a:effectRef>
-          <a:fontRef idx="minor">
-            <a:schemeClr val="dk1"/>
-          </a:fontRef>
-        </p:style>
-        <p:txBody>
-          <a:bodyPr lIns="0" tIns="0" rIns="0" bIns="0" rtlCol="0" anchor="ctr"/>
-          <a:lstStyle/>
-          <a:p>
-            <a:pPr algn="ctr"/>
-            <a:r>
-              <a:rPr lang="en-US" sz="1400" dirty="0" err="1"/>
-              <a:t>map_and_context</a:t>
-            </a:r>
-            <a:endParaRPr lang="en-US" sz="1400" dirty="0"/>
-          </a:p>
-        </p:txBody>
-      </p:sp>
-      <p:cxnSp>
-        <p:nvCxnSpPr>
-          <p:cNvPr id="93" name="Connector: Elbow 92">
-            <a:extLst>
-              <a:ext uri="{FF2B5EF4-FFF2-40B4-BE49-F238E27FC236}">
-                <a16:creationId xmlns:a16="http://schemas.microsoft.com/office/drawing/2014/main" id="{1C161A02-44FB-A4D3-C64A-26AD39789F67}"/>
-              </a:ext>
-            </a:extLst>
-          </p:cNvPr>
-          <p:cNvCxnSpPr>
-            <a:cxnSpLocks/>
-            <a:stCxn id="20" idx="2"/>
-            <a:endCxn id="12" idx="0"/>
-          </p:cNvCxnSpPr>
-          <p:nvPr/>
-        </p:nvCxnSpPr>
-        <p:spPr>
-          <a:xfrm rot="16200000" flipH="1">
-            <a:off x="4058064" y="2860237"/>
-            <a:ext cx="854618" cy="2632042"/>
-          </a:xfrm>
-          <a:prstGeom prst="bentConnector3">
-            <a:avLst/>
-          </a:prstGeom>
-          <a:ln w="63500">
-            <a:solidFill>
-              <a:schemeClr val="accent1">
-                <a:lumMod val="40000"/>
-                <a:lumOff val="60000"/>
-              </a:schemeClr>
-            </a:solidFill>
-          </a:ln>
-        </p:spPr>
-        <p:style>
-          <a:lnRef idx="3">
-            <a:schemeClr val="dk1"/>
-          </a:lnRef>
-          <a:fillRef idx="0">
-            <a:schemeClr val="dk1"/>
-          </a:fillRef>
-          <a:effectRef idx="2">
-            <a:schemeClr val="dk1"/>
-          </a:effectRef>
-          <a:fontRef idx="minor">
-            <a:schemeClr val="tx1"/>
-          </a:fontRef>
-        </p:style>
-      </p:cxnSp>
-      <p:cxnSp>
-        <p:nvCxnSpPr>
-          <p:cNvPr id="94" name="Connector: Elbow 93">
-            <a:extLst>
-              <a:ext uri="{FF2B5EF4-FFF2-40B4-BE49-F238E27FC236}">
-                <a16:creationId xmlns:a16="http://schemas.microsoft.com/office/drawing/2014/main" id="{232E83AB-49F7-6607-EEFA-224FCEB3E35F}"/>
-              </a:ext>
-            </a:extLst>
-          </p:cNvPr>
-          <p:cNvCxnSpPr>
-            <a:cxnSpLocks/>
-            <a:stCxn id="20" idx="2"/>
-            <a:endCxn id="11" idx="0"/>
-          </p:cNvCxnSpPr>
-          <p:nvPr/>
-        </p:nvCxnSpPr>
-        <p:spPr>
-          <a:xfrm rot="5400000">
-            <a:off x="2238855" y="3673070"/>
-            <a:ext cx="854618" cy="1006376"/>
-          </a:xfrm>
-          <a:prstGeom prst="bentConnector3">
-            <a:avLst/>
-          </a:prstGeom>
-          <a:ln w="63500">
-            <a:solidFill>
-              <a:schemeClr val="accent1">
-                <a:lumMod val="40000"/>
-                <a:lumOff val="60000"/>
-              </a:schemeClr>
-            </a:solidFill>
-          </a:ln>
-        </p:spPr>
-        <p:style>
-          <a:lnRef idx="3">
-            <a:schemeClr val="dk1"/>
-          </a:lnRef>
-          <a:fillRef idx="0">
-            <a:schemeClr val="dk1"/>
-          </a:fillRef>
-          <a:effectRef idx="2">
-            <a:schemeClr val="dk1"/>
-          </a:effectRef>
-          <a:fontRef idx="minor">
-            <a:schemeClr val="tx1"/>
-          </a:fontRef>
-        </p:style>
-      </p:cxnSp>
-      <p:cxnSp>
-        <p:nvCxnSpPr>
-          <p:cNvPr id="30" name="Connector: Elbow 29">
-            <a:extLst>
-              <a:ext uri="{FF2B5EF4-FFF2-40B4-BE49-F238E27FC236}">
-                <a16:creationId xmlns:a16="http://schemas.microsoft.com/office/drawing/2014/main" id="{F0A164A8-8808-19C1-F72E-9DA315FACB22}"/>
-              </a:ext>
-            </a:extLst>
-          </p:cNvPr>
-          <p:cNvCxnSpPr>
-            <a:cxnSpLocks/>
-            <a:stCxn id="20" idx="2"/>
-            <a:endCxn id="7" idx="0"/>
-          </p:cNvCxnSpPr>
-          <p:nvPr/>
-        </p:nvCxnSpPr>
-        <p:spPr>
-          <a:xfrm rot="16200000" flipH="1">
-            <a:off x="3063069" y="3855231"/>
-            <a:ext cx="854618" cy="642053"/>
-          </a:xfrm>
-          <a:prstGeom prst="bentConnector3">
-            <a:avLst>
-              <a:gd name="adj1" fmla="val 50000"/>
-            </a:avLst>
-          </a:prstGeom>
-          <a:ln w="63500">
-            <a:solidFill>
-              <a:schemeClr val="accent1">
-                <a:lumMod val="40000"/>
-                <a:lumOff val="60000"/>
-              </a:schemeClr>
-            </a:solidFill>
-          </a:ln>
-        </p:spPr>
-        <p:style>
-          <a:lnRef idx="3">
-            <a:schemeClr val="dk1"/>
-          </a:lnRef>
-          <a:fillRef idx="0">
-            <a:schemeClr val="dk1"/>
-          </a:fillRef>
-          <a:effectRef idx="2">
-            <a:schemeClr val="dk1"/>
-          </a:effectRef>
-          <a:fontRef idx="minor">
-            <a:schemeClr val="tx1"/>
-          </a:fontRef>
-        </p:style>
-      </p:cxnSp>
-      <p:sp>
-        <p:nvSpPr>
-          <p:cNvPr id="47" name="TextBox 46">
-            <a:extLst>
-              <a:ext uri="{FF2B5EF4-FFF2-40B4-BE49-F238E27FC236}">
-                <a16:creationId xmlns:a16="http://schemas.microsoft.com/office/drawing/2014/main" id="{6AE816DF-B219-8530-54BE-2891E2362FF5}"/>
-              </a:ext>
-            </a:extLst>
-          </p:cNvPr>
-          <p:cNvSpPr txBox="1"/>
-          <p:nvPr/>
-        </p:nvSpPr>
-        <p:spPr>
-          <a:xfrm>
-            <a:off x="1056606" y="561608"/>
-            <a:ext cx="4744788" cy="2862322"/>
-          </a:xfrm>
-          <a:prstGeom prst="rect">
-            <a:avLst/>
-          </a:prstGeom>
-          <a:noFill/>
-        </p:spPr>
-        <p:txBody>
-          <a:bodyPr wrap="square" rtlCol="0">
-            <a:spAutoFit/>
-          </a:bodyPr>
-          <a:lstStyle/>
-          <a:p>
-            <a:pPr marL="342900" indent="-342900">
-              <a:buFont typeface="Wingdings" panose="05000000000000000000" pitchFamily="2" charset="2"/>
-              <a:buChar char="ü"/>
-            </a:pPr>
-            <a:r>
-              <a:rPr lang="en-US" dirty="0">
-                <a:solidFill>
-                  <a:srgbClr val="C00000"/>
-                </a:solidFill>
-              </a:rPr>
-              <a:t>Can we make </a:t>
-            </a:r>
-            <a:r>
-              <a:rPr lang="en-US" dirty="0" err="1">
-                <a:solidFill>
-                  <a:srgbClr val="C00000"/>
-                </a:solidFill>
-              </a:rPr>
-              <a:t>make_patch</a:t>
-            </a:r>
-            <a:r>
-              <a:rPr lang="en-US" dirty="0">
-                <a:solidFill>
-                  <a:srgbClr val="C00000"/>
-                </a:solidFill>
-              </a:rPr>
-              <a:t>, </a:t>
-            </a:r>
-            <a:r>
-              <a:rPr lang="en-US" dirty="0" err="1">
-                <a:solidFill>
-                  <a:srgbClr val="C00000"/>
-                </a:solidFill>
-              </a:rPr>
-              <a:t>plot_patch</a:t>
-            </a:r>
-            <a:r>
-              <a:rPr lang="en-US" dirty="0">
-                <a:solidFill>
-                  <a:srgbClr val="C00000"/>
-                </a:solidFill>
-              </a:rPr>
-              <a:t>, and make_contours_CH4_patch all the same level of call and call them in sequence?</a:t>
-            </a:r>
-          </a:p>
-          <a:p>
-            <a:pPr marL="342900" indent="-342900">
-              <a:buFont typeface="Wingdings" panose="05000000000000000000" pitchFamily="2" charset="2"/>
-              <a:buChar char="ü"/>
-            </a:pPr>
-            <a:r>
-              <a:rPr lang="en-US" dirty="0">
-                <a:solidFill>
-                  <a:srgbClr val="C00000"/>
-                </a:solidFill>
-              </a:rPr>
-              <a:t>Can we set the color table for the map and scatter to “Blues” rather than greys</a:t>
-            </a:r>
-          </a:p>
-          <a:p>
-            <a:pPr marL="342900" indent="-342900">
-              <a:buFont typeface="Arial" panose="020B0604020202020204" pitchFamily="34" charset="0"/>
-              <a:buChar char="•"/>
-            </a:pPr>
-            <a:r>
-              <a:rPr lang="en-US" dirty="0">
-                <a:solidFill>
-                  <a:srgbClr val="C00000"/>
-                </a:solidFill>
-              </a:rPr>
-              <a:t>Can we provide an alternative that over plots in red and black only the most extreme contours of fNH3 and </a:t>
-            </a:r>
-            <a:r>
-              <a:rPr lang="en-US" dirty="0" err="1">
-                <a:solidFill>
-                  <a:srgbClr val="C00000"/>
-                </a:solidFill>
-              </a:rPr>
-              <a:t>PCld</a:t>
-            </a:r>
-            <a:r>
-              <a:rPr lang="en-US" dirty="0">
-                <a:solidFill>
-                  <a:srgbClr val="C00000"/>
-                </a:solidFill>
-              </a:rPr>
-              <a:t>? This would match what was developed for the EPSC abstract in </a:t>
-            </a:r>
-          </a:p>
-        </p:txBody>
-      </p:sp>
-      <p:cxnSp>
-        <p:nvCxnSpPr>
-          <p:cNvPr id="8" name="Connector: Elbow 7">
-            <a:extLst>
-              <a:ext uri="{FF2B5EF4-FFF2-40B4-BE49-F238E27FC236}">
-                <a16:creationId xmlns:a16="http://schemas.microsoft.com/office/drawing/2014/main" id="{453C762E-5D09-52D1-13C5-2F6E131A4EFD}"/>
-              </a:ext>
-            </a:extLst>
-          </p:cNvPr>
-          <p:cNvCxnSpPr>
-            <a:cxnSpLocks/>
-            <a:stCxn id="20" idx="2"/>
-            <a:endCxn id="6" idx="0"/>
-          </p:cNvCxnSpPr>
-          <p:nvPr/>
-        </p:nvCxnSpPr>
-        <p:spPr>
-          <a:xfrm rot="5400000">
-            <a:off x="1557066" y="2991281"/>
-            <a:ext cx="854618" cy="2369954"/>
-          </a:xfrm>
-          <a:prstGeom prst="bentConnector3">
-            <a:avLst/>
-          </a:prstGeom>
-          <a:ln w="63500">
-            <a:solidFill>
-              <a:schemeClr val="accent1">
-                <a:lumMod val="40000"/>
-                <a:lumOff val="60000"/>
-              </a:schemeClr>
-            </a:solidFill>
-          </a:ln>
-        </p:spPr>
-        <p:style>
-          <a:lnRef idx="3">
-            <a:schemeClr val="dk1"/>
-          </a:lnRef>
-          <a:fillRef idx="0">
-            <a:schemeClr val="dk1"/>
-          </a:fillRef>
-          <a:effectRef idx="2">
-            <a:schemeClr val="dk1"/>
-          </a:effectRef>
-          <a:fontRef idx="minor">
-            <a:schemeClr val="tx1"/>
-          </a:fontRef>
-        </p:style>
-      </p:cxnSp>
-    </p:spTree>
-    <p:extLst>
-      <p:ext uri="{BB962C8B-B14F-4D97-AF65-F5344CB8AC3E}">
-        <p14:creationId xmlns:p14="http://schemas.microsoft.com/office/powerpoint/2010/main" val="3700671130"/>
-      </p:ext>
-    </p:extLst>
-  </p:cSld>
-  <p:clrMapOvr>
-    <a:masterClrMapping/>
-  </p:clrMapOvr>
-</p:sld>
-</file>
-
-<file path=ppt/slides/slide4.xml><?xml version="1.0" encoding="utf-8"?>
-<p:sld xmlns:a="http://schemas.openxmlformats.org/drawingml/2006/main" xmlns:r="http://schemas.openxmlformats.org/officeDocument/2006/relationships" xmlns:p="http://schemas.openxmlformats.org/presentationml/2006/main">
-  <p:cSld>
-    <p:spTree>
-      <p:nvGrpSpPr>
-        <p:cNvPr id="1" name="">
-          <a:extLst>
-            <a:ext uri="{FF2B5EF4-FFF2-40B4-BE49-F238E27FC236}">
-              <a16:creationId xmlns:a16="http://schemas.microsoft.com/office/drawing/2014/main" id="{28EA224B-0645-0FE8-CC4D-2313E95662E7}"/>
-            </a:ext>
-          </a:extLst>
-        </p:cNvPr>
-        <p:cNvGrpSpPr/>
-        <p:nvPr/>
-      </p:nvGrpSpPr>
-      <p:grpSpPr>
-        <a:xfrm>
-          <a:off x="0" y="0"/>
-          <a:ext cx="0" cy="0"/>
-          <a:chOff x="0" y="0"/>
-          <a:chExt cx="0" cy="0"/>
-        </a:xfrm>
-      </p:grpSpPr>
-      <p:sp>
-        <p:nvSpPr>
-          <p:cNvPr id="6" name="Rectangle: Rounded Corners 5">
-            <a:extLst>
-              <a:ext uri="{FF2B5EF4-FFF2-40B4-BE49-F238E27FC236}">
-                <a16:creationId xmlns:a16="http://schemas.microsoft.com/office/drawing/2014/main" id="{657EE994-A3CD-1C1C-3160-431F91E5182C}"/>
-              </a:ext>
-            </a:extLst>
-          </p:cNvPr>
-          <p:cNvSpPr/>
-          <p:nvPr/>
-        </p:nvSpPr>
-        <p:spPr>
-          <a:xfrm>
-            <a:off x="483754" y="4092506"/>
-            <a:ext cx="845108" cy="336884"/>
-          </a:xfrm>
-          <a:prstGeom prst="roundRect">
-            <a:avLst/>
-          </a:prstGeom>
-          <a:ln w="28575"/>
-        </p:spPr>
-        <p:style>
-          <a:lnRef idx="2">
-            <a:schemeClr val="dk1"/>
-          </a:lnRef>
-          <a:fillRef idx="1">
-            <a:schemeClr val="lt1"/>
-          </a:fillRef>
-          <a:effectRef idx="0">
-            <a:schemeClr val="dk1"/>
-          </a:effectRef>
-          <a:fontRef idx="minor">
-            <a:schemeClr val="dk1"/>
-          </a:fontRef>
-        </p:style>
-        <p:txBody>
-          <a:bodyPr lIns="0" tIns="0" rIns="0" bIns="0" rtlCol="0" anchor="ctr"/>
-          <a:lstStyle/>
-          <a:p>
-            <a:pPr algn="ctr"/>
-            <a:r>
-              <a:rPr lang="en-US" sz="1200" dirty="0" err="1"/>
-              <a:t>make_patch</a:t>
-            </a:r>
-            <a:endParaRPr lang="en-US" sz="1200" dirty="0"/>
-          </a:p>
-        </p:txBody>
-      </p:sp>
-      <p:sp>
-        <p:nvSpPr>
-          <p:cNvPr id="7" name="Rectangle: Rounded Corners 6">
-            <a:extLst>
-              <a:ext uri="{FF2B5EF4-FFF2-40B4-BE49-F238E27FC236}">
-                <a16:creationId xmlns:a16="http://schemas.microsoft.com/office/drawing/2014/main" id="{BCB85808-5977-0C23-0630-92847C854DB5}"/>
-              </a:ext>
-            </a:extLst>
-          </p:cNvPr>
-          <p:cNvSpPr/>
-          <p:nvPr/>
-        </p:nvSpPr>
-        <p:spPr>
-          <a:xfrm>
-            <a:off x="2324898" y="4092506"/>
-            <a:ext cx="1783406" cy="336884"/>
-          </a:xfrm>
-          <a:prstGeom prst="roundRect">
-            <a:avLst/>
-          </a:prstGeom>
-          <a:ln w="28575"/>
-        </p:spPr>
-        <p:style>
-          <a:lnRef idx="2">
-            <a:schemeClr val="dk1"/>
-          </a:lnRef>
-          <a:fillRef idx="1">
-            <a:schemeClr val="lt1"/>
-          </a:fillRef>
-          <a:effectRef idx="0">
-            <a:schemeClr val="dk1"/>
-          </a:effectRef>
-          <a:fontRef idx="minor">
-            <a:schemeClr val="dk1"/>
-          </a:fontRef>
-        </p:style>
-        <p:txBody>
-          <a:bodyPr lIns="0" tIns="0" rIns="0" bIns="0" rtlCol="0" anchor="ctr"/>
-          <a:lstStyle/>
-          <a:p>
-            <a:pPr algn="ctr"/>
-            <a:r>
-              <a:rPr lang="en-US" sz="1200" dirty="0" err="1"/>
-              <a:t>plot_contours_on_patch</a:t>
-            </a:r>
-            <a:endParaRPr lang="en-US" sz="1200" dirty="0"/>
-          </a:p>
-        </p:txBody>
-      </p:sp>
-      <p:sp>
-        <p:nvSpPr>
-          <p:cNvPr id="11" name="Rectangle: Rounded Corners 10">
-            <a:extLst>
-              <a:ext uri="{FF2B5EF4-FFF2-40B4-BE49-F238E27FC236}">
-                <a16:creationId xmlns:a16="http://schemas.microsoft.com/office/drawing/2014/main" id="{3AB9DECD-5612-B648-295A-8D8E6C1CC322}"/>
-              </a:ext>
-            </a:extLst>
-          </p:cNvPr>
-          <p:cNvSpPr/>
-          <p:nvPr/>
-        </p:nvSpPr>
-        <p:spPr>
-          <a:xfrm>
-            <a:off x="1454153" y="4092506"/>
-            <a:ext cx="745454" cy="336884"/>
-          </a:xfrm>
-          <a:prstGeom prst="roundRect">
-            <a:avLst/>
-          </a:prstGeom>
-          <a:ln w="28575"/>
-        </p:spPr>
-        <p:style>
-          <a:lnRef idx="2">
-            <a:schemeClr val="dk1"/>
-          </a:lnRef>
-          <a:fillRef idx="1">
-            <a:schemeClr val="lt1"/>
-          </a:fillRef>
-          <a:effectRef idx="0">
-            <a:schemeClr val="dk1"/>
-          </a:effectRef>
-          <a:fontRef idx="minor">
-            <a:schemeClr val="dk1"/>
-          </a:fontRef>
-        </p:style>
-        <p:txBody>
-          <a:bodyPr lIns="0" tIns="0" rIns="0" bIns="0" rtlCol="0" anchor="ctr"/>
-          <a:lstStyle/>
-          <a:p>
-            <a:pPr algn="ctr"/>
-            <a:r>
-              <a:rPr lang="en-US" sz="1200" dirty="0" err="1"/>
-              <a:t>plot_patch</a:t>
-            </a:r>
-            <a:endParaRPr lang="en-US" sz="1200" dirty="0"/>
-          </a:p>
-        </p:txBody>
-      </p:sp>
-      <p:sp>
-        <p:nvSpPr>
-          <p:cNvPr id="21" name="Rectangle: Rounded Corners 20">
-            <a:extLst>
-              <a:ext uri="{FF2B5EF4-FFF2-40B4-BE49-F238E27FC236}">
-                <a16:creationId xmlns:a16="http://schemas.microsoft.com/office/drawing/2014/main" id="{C0A2653E-BC75-6071-CBCC-B8988E179974}"/>
-              </a:ext>
-            </a:extLst>
-          </p:cNvPr>
-          <p:cNvSpPr/>
-          <p:nvPr/>
-        </p:nvSpPr>
-        <p:spPr>
-          <a:xfrm>
-            <a:off x="2749696" y="3146251"/>
-            <a:ext cx="1358608" cy="336884"/>
-          </a:xfrm>
-          <a:prstGeom prst="roundRect">
-            <a:avLst/>
-          </a:prstGeom>
-          <a:ln w="28575"/>
-        </p:spPr>
-        <p:style>
-          <a:lnRef idx="2">
-            <a:schemeClr val="dk1"/>
-          </a:lnRef>
-          <a:fillRef idx="1">
-            <a:schemeClr val="lt1"/>
-          </a:fillRef>
-          <a:effectRef idx="0">
-            <a:schemeClr val="dk1"/>
-          </a:effectRef>
-          <a:fontRef idx="minor">
-            <a:schemeClr val="dk1"/>
-          </a:fontRef>
-        </p:style>
-        <p:txBody>
-          <a:bodyPr lIns="0" tIns="0" rIns="0" bIns="0" rtlCol="0" anchor="ctr"/>
-          <a:lstStyle/>
-          <a:p>
-            <a:pPr algn="ctr"/>
-            <a:r>
-              <a:rPr lang="en-US" sz="1400" dirty="0" err="1"/>
-              <a:t>map_and_scatter</a:t>
-            </a:r>
-            <a:endParaRPr lang="en-US" sz="1400" dirty="0"/>
-          </a:p>
-        </p:txBody>
-      </p:sp>
-      <p:cxnSp>
-        <p:nvCxnSpPr>
-          <p:cNvPr id="108" name="Connector: Elbow 107">
-            <a:extLst>
-              <a:ext uri="{FF2B5EF4-FFF2-40B4-BE49-F238E27FC236}">
-                <a16:creationId xmlns:a16="http://schemas.microsoft.com/office/drawing/2014/main" id="{5621AB90-0B5B-9723-D6F9-047E5E3301BD}"/>
-              </a:ext>
-            </a:extLst>
-          </p:cNvPr>
-          <p:cNvCxnSpPr>
-            <a:cxnSpLocks/>
-            <a:stCxn id="21" idx="2"/>
-            <a:endCxn id="7" idx="0"/>
-          </p:cNvCxnSpPr>
-          <p:nvPr/>
-        </p:nvCxnSpPr>
-        <p:spPr>
-          <a:xfrm rot="5400000">
-            <a:off x="3018116" y="3681621"/>
-            <a:ext cx="609371" cy="212399"/>
-          </a:xfrm>
-          <a:prstGeom prst="bentConnector3">
-            <a:avLst>
-              <a:gd name="adj1" fmla="val 50000"/>
-            </a:avLst>
-          </a:prstGeom>
-          <a:ln w="63500">
-            <a:solidFill>
-              <a:schemeClr val="accent1">
-                <a:lumMod val="40000"/>
-                <a:lumOff val="60000"/>
-              </a:schemeClr>
-            </a:solidFill>
-          </a:ln>
-        </p:spPr>
-        <p:style>
-          <a:lnRef idx="3">
-            <a:schemeClr val="dk1"/>
-          </a:lnRef>
-          <a:fillRef idx="0">
-            <a:schemeClr val="dk1"/>
-          </a:fillRef>
-          <a:effectRef idx="2">
-            <a:schemeClr val="dk1"/>
-          </a:effectRef>
-          <a:fontRef idx="minor">
-            <a:schemeClr val="tx1"/>
-          </a:fontRef>
-        </p:style>
-      </p:cxnSp>
-      <p:sp>
-        <p:nvSpPr>
-          <p:cNvPr id="143" name="Rectangle: Rounded Corners 142">
-            <a:extLst>
-              <a:ext uri="{FF2B5EF4-FFF2-40B4-BE49-F238E27FC236}">
-                <a16:creationId xmlns:a16="http://schemas.microsoft.com/office/drawing/2014/main" id="{FA9549E7-5FF0-146C-4DA6-726B2C221A4D}"/>
-              </a:ext>
-            </a:extLst>
-          </p:cNvPr>
-          <p:cNvSpPr/>
-          <p:nvPr/>
-        </p:nvSpPr>
-        <p:spPr>
-          <a:xfrm>
-            <a:off x="4239675" y="4092506"/>
-            <a:ext cx="1157156" cy="336884"/>
-          </a:xfrm>
-          <a:prstGeom prst="roundRect">
-            <a:avLst/>
-          </a:prstGeom>
-          <a:ln w="28575"/>
-        </p:spPr>
-        <p:style>
-          <a:lnRef idx="2">
-            <a:schemeClr val="dk1"/>
-          </a:lnRef>
-          <a:fillRef idx="1">
-            <a:schemeClr val="lt1"/>
-          </a:fillRef>
-          <a:effectRef idx="0">
-            <a:schemeClr val="dk1"/>
-          </a:effectRef>
-          <a:fontRef idx="minor">
-            <a:schemeClr val="dk1"/>
-          </a:fontRef>
-        </p:style>
-        <p:txBody>
-          <a:bodyPr lIns="0" tIns="0" rIns="0" bIns="0" rtlCol="0" anchor="ctr"/>
-          <a:lstStyle/>
-          <a:p>
-            <a:pPr algn="ctr"/>
-            <a:r>
-              <a:rPr lang="en-US" sz="1200" dirty="0" err="1"/>
-              <a:t>plot_roi_scatter</a:t>
-            </a:r>
-            <a:endParaRPr lang="en-US" sz="1200" dirty="0"/>
-          </a:p>
-        </p:txBody>
-      </p:sp>
-      <p:sp>
-        <p:nvSpPr>
-          <p:cNvPr id="144" name="Rectangle: Rounded Corners 143">
-            <a:extLst>
-              <a:ext uri="{FF2B5EF4-FFF2-40B4-BE49-F238E27FC236}">
-                <a16:creationId xmlns:a16="http://schemas.microsoft.com/office/drawing/2014/main" id="{D223F6C3-F941-540B-C7DC-1F7348605330}"/>
-              </a:ext>
-            </a:extLst>
-          </p:cNvPr>
-          <p:cNvSpPr/>
-          <p:nvPr/>
-        </p:nvSpPr>
-        <p:spPr>
-          <a:xfrm>
-            <a:off x="5492104" y="4092506"/>
-            <a:ext cx="1131256" cy="336884"/>
-          </a:xfrm>
-          <a:prstGeom prst="roundRect">
-            <a:avLst/>
-          </a:prstGeom>
-          <a:ln w="28575"/>
-        </p:spPr>
-        <p:style>
-          <a:lnRef idx="2">
-            <a:schemeClr val="dk1"/>
-          </a:lnRef>
-          <a:fillRef idx="1">
-            <a:schemeClr val="lt1"/>
-          </a:fillRef>
-          <a:effectRef idx="0">
-            <a:schemeClr val="dk1"/>
-          </a:effectRef>
-          <a:fontRef idx="minor">
-            <a:schemeClr val="dk1"/>
-          </a:fontRef>
-        </p:style>
-        <p:txBody>
-          <a:bodyPr lIns="0" tIns="0" rIns="0" bIns="0" rtlCol="0" anchor="ctr"/>
-          <a:lstStyle/>
-          <a:p>
-            <a:pPr algn="ctr"/>
-            <a:r>
-              <a:rPr lang="en-US" sz="1200" dirty="0" err="1"/>
-              <a:t>plot_map_scatter</a:t>
-            </a:r>
-            <a:endParaRPr lang="en-US" sz="1200" dirty="0"/>
-          </a:p>
-        </p:txBody>
-      </p:sp>
-      <p:cxnSp>
-        <p:nvCxnSpPr>
-          <p:cNvPr id="162" name="Connector: Elbow 161">
-            <a:extLst>
-              <a:ext uri="{FF2B5EF4-FFF2-40B4-BE49-F238E27FC236}">
-                <a16:creationId xmlns:a16="http://schemas.microsoft.com/office/drawing/2014/main" id="{4F38CA7D-3690-6198-F6D7-8BC119CFB06B}"/>
-              </a:ext>
-            </a:extLst>
-          </p:cNvPr>
-          <p:cNvCxnSpPr>
-            <a:cxnSpLocks/>
-            <a:stCxn id="21" idx="2"/>
-            <a:endCxn id="143" idx="0"/>
-          </p:cNvCxnSpPr>
-          <p:nvPr/>
-        </p:nvCxnSpPr>
-        <p:spPr>
-          <a:xfrm rot="16200000" flipH="1">
-            <a:off x="3818941" y="3093193"/>
-            <a:ext cx="609371" cy="1389253"/>
-          </a:xfrm>
-          <a:prstGeom prst="bentConnector3">
-            <a:avLst>
-              <a:gd name="adj1" fmla="val 50000"/>
-            </a:avLst>
-          </a:prstGeom>
-          <a:ln w="63500">
-            <a:solidFill>
-              <a:schemeClr val="accent1">
-                <a:lumMod val="40000"/>
-                <a:lumOff val="60000"/>
-              </a:schemeClr>
-            </a:solidFill>
-          </a:ln>
-        </p:spPr>
-        <p:style>
-          <a:lnRef idx="3">
-            <a:schemeClr val="dk1"/>
-          </a:lnRef>
-          <a:fillRef idx="0">
-            <a:schemeClr val="dk1"/>
-          </a:fillRef>
-          <a:effectRef idx="2">
-            <a:schemeClr val="dk1"/>
-          </a:effectRef>
-          <a:fontRef idx="minor">
-            <a:schemeClr val="tx1"/>
-          </a:fontRef>
-        </p:style>
-      </p:cxnSp>
-      <p:cxnSp>
-        <p:nvCxnSpPr>
-          <p:cNvPr id="163" name="Connector: Elbow 162">
-            <a:extLst>
-              <a:ext uri="{FF2B5EF4-FFF2-40B4-BE49-F238E27FC236}">
-                <a16:creationId xmlns:a16="http://schemas.microsoft.com/office/drawing/2014/main" id="{6B3DC452-8483-0B15-DD87-C9397CEE080A}"/>
-              </a:ext>
-            </a:extLst>
-          </p:cNvPr>
-          <p:cNvCxnSpPr>
-            <a:cxnSpLocks/>
-            <a:stCxn id="21" idx="2"/>
-            <a:endCxn id="144" idx="0"/>
-          </p:cNvCxnSpPr>
-          <p:nvPr/>
-        </p:nvCxnSpPr>
-        <p:spPr>
-          <a:xfrm rot="16200000" flipH="1">
-            <a:off x="4438681" y="2473454"/>
-            <a:ext cx="609371" cy="2628732"/>
-          </a:xfrm>
-          <a:prstGeom prst="bentConnector3">
-            <a:avLst>
-              <a:gd name="adj1" fmla="val 50000"/>
-            </a:avLst>
-          </a:prstGeom>
-          <a:ln w="63500">
-            <a:solidFill>
-              <a:schemeClr val="accent1">
-                <a:lumMod val="40000"/>
-                <a:lumOff val="60000"/>
-              </a:schemeClr>
-            </a:solidFill>
-          </a:ln>
-        </p:spPr>
-        <p:style>
-          <a:lnRef idx="3">
-            <a:schemeClr val="dk1"/>
-          </a:lnRef>
-          <a:fillRef idx="0">
-            <a:schemeClr val="dk1"/>
-          </a:fillRef>
-          <a:effectRef idx="2">
-            <a:schemeClr val="dk1"/>
-          </a:effectRef>
-          <a:fontRef idx="minor">
-            <a:schemeClr val="tx1"/>
-          </a:fontRef>
-        </p:style>
-      </p:cxnSp>
-      <p:cxnSp>
-        <p:nvCxnSpPr>
-          <p:cNvPr id="2" name="Connector: Elbow 1">
-            <a:extLst>
-              <a:ext uri="{FF2B5EF4-FFF2-40B4-BE49-F238E27FC236}">
-                <a16:creationId xmlns:a16="http://schemas.microsoft.com/office/drawing/2014/main" id="{1F231C78-7042-D3B0-5340-0309E59392E3}"/>
-              </a:ext>
-            </a:extLst>
-          </p:cNvPr>
-          <p:cNvCxnSpPr>
-            <a:cxnSpLocks/>
-            <a:stCxn id="21" idx="2"/>
-            <a:endCxn id="11" idx="0"/>
-          </p:cNvCxnSpPr>
-          <p:nvPr/>
-        </p:nvCxnSpPr>
-        <p:spPr>
-          <a:xfrm rot="5400000">
-            <a:off x="2323255" y="2986760"/>
-            <a:ext cx="609371" cy="1602120"/>
-          </a:xfrm>
-          <a:prstGeom prst="bentConnector3">
-            <a:avLst>
-              <a:gd name="adj1" fmla="val 50000"/>
-            </a:avLst>
-          </a:prstGeom>
-          <a:ln w="63500">
-            <a:solidFill>
-              <a:schemeClr val="accent1">
-                <a:lumMod val="40000"/>
-                <a:lumOff val="60000"/>
-              </a:schemeClr>
-            </a:solidFill>
-          </a:ln>
-        </p:spPr>
-        <p:style>
-          <a:lnRef idx="3">
-            <a:schemeClr val="dk1"/>
-          </a:lnRef>
-          <a:fillRef idx="0">
-            <a:schemeClr val="dk1"/>
-          </a:fillRef>
-          <a:effectRef idx="2">
-            <a:schemeClr val="dk1"/>
-          </a:effectRef>
-          <a:fontRef idx="minor">
-            <a:schemeClr val="tx1"/>
-          </a:fontRef>
-        </p:style>
-      </p:cxnSp>
-      <p:sp>
-        <p:nvSpPr>
-          <p:cNvPr id="18" name="TextBox 17">
-            <a:extLst>
-              <a:ext uri="{FF2B5EF4-FFF2-40B4-BE49-F238E27FC236}">
-                <a16:creationId xmlns:a16="http://schemas.microsoft.com/office/drawing/2014/main" id="{78276185-B4DD-22C7-C654-ABE96656ED07}"/>
-              </a:ext>
-            </a:extLst>
-          </p:cNvPr>
-          <p:cNvSpPr txBox="1"/>
-          <p:nvPr/>
-        </p:nvSpPr>
-        <p:spPr>
-          <a:xfrm>
-            <a:off x="1056606" y="561608"/>
-            <a:ext cx="4744788" cy="2308324"/>
-          </a:xfrm>
-          <a:prstGeom prst="rect">
-            <a:avLst/>
-          </a:prstGeom>
-          <a:noFill/>
-        </p:spPr>
-        <p:txBody>
-          <a:bodyPr wrap="square" rtlCol="0">
-            <a:spAutoFit/>
-          </a:bodyPr>
-          <a:lstStyle/>
-          <a:p>
-            <a:pPr marL="342900" indent="-342900">
-              <a:buFont typeface="Wingdings" panose="05000000000000000000" pitchFamily="2" charset="2"/>
-              <a:buChar char="ü"/>
-            </a:pPr>
-            <a:r>
-              <a:rPr lang="en-US" dirty="0">
-                <a:solidFill>
-                  <a:srgbClr val="C00000"/>
-                </a:solidFill>
-              </a:rPr>
-              <a:t>Can we make </a:t>
-            </a:r>
-            <a:r>
-              <a:rPr lang="en-US" dirty="0" err="1">
-                <a:solidFill>
-                  <a:srgbClr val="C00000"/>
-                </a:solidFill>
-              </a:rPr>
-              <a:t>make_patch</a:t>
-            </a:r>
-            <a:r>
-              <a:rPr lang="en-US" dirty="0">
-                <a:solidFill>
-                  <a:srgbClr val="C00000"/>
-                </a:solidFill>
-              </a:rPr>
-              <a:t>, </a:t>
-            </a:r>
-            <a:r>
-              <a:rPr lang="en-US" dirty="0" err="1">
-                <a:solidFill>
-                  <a:srgbClr val="C00000"/>
-                </a:solidFill>
-              </a:rPr>
-              <a:t>plot_patch</a:t>
-            </a:r>
-            <a:r>
-              <a:rPr lang="en-US" dirty="0">
-                <a:solidFill>
-                  <a:srgbClr val="C00000"/>
-                </a:solidFill>
-              </a:rPr>
-              <a:t>, and make_contours_CH4_patch all the same level of call and call them in sequence?</a:t>
-            </a:r>
-          </a:p>
-          <a:p>
-            <a:pPr marL="342900" indent="-342900">
-              <a:buFont typeface="Wingdings" panose="05000000000000000000" pitchFamily="2" charset="2"/>
-              <a:buChar char="ü"/>
-            </a:pPr>
-            <a:r>
-              <a:rPr lang="en-US" dirty="0">
-                <a:solidFill>
-                  <a:srgbClr val="C00000"/>
-                </a:solidFill>
-              </a:rPr>
-              <a:t>Can we set the color table for the map and scatter to “Blues” rather than greys</a:t>
-            </a:r>
-          </a:p>
-          <a:p>
-            <a:pPr marL="342900" indent="-342900">
-              <a:buFont typeface="Arial" panose="020B0604020202020204" pitchFamily="34" charset="0"/>
-              <a:buChar char="•"/>
-            </a:pPr>
-            <a:r>
-              <a:rPr lang="en-US" dirty="0">
-                <a:solidFill>
-                  <a:srgbClr val="C00000"/>
-                </a:solidFill>
-              </a:rPr>
-              <a:t>Can we provide an alternative that over plots in red and black only the most extreme contours of fNH3 and </a:t>
-            </a:r>
-            <a:r>
-              <a:rPr lang="en-US" dirty="0" err="1">
-                <a:solidFill>
-                  <a:srgbClr val="C00000"/>
-                </a:solidFill>
-              </a:rPr>
-              <a:t>PCld</a:t>
-            </a:r>
-            <a:r>
-              <a:rPr lang="en-US" dirty="0">
-                <a:solidFill>
-                  <a:srgbClr val="C00000"/>
-                </a:solidFill>
-              </a:rPr>
-              <a:t>?</a:t>
-            </a:r>
-          </a:p>
-        </p:txBody>
-      </p:sp>
-      <p:cxnSp>
-        <p:nvCxnSpPr>
-          <p:cNvPr id="4" name="Connector: Elbow 3">
-            <a:extLst>
-              <a:ext uri="{FF2B5EF4-FFF2-40B4-BE49-F238E27FC236}">
-                <a16:creationId xmlns:a16="http://schemas.microsoft.com/office/drawing/2014/main" id="{8550BD9A-483B-9318-1DC5-F64571E67730}"/>
-              </a:ext>
-            </a:extLst>
-          </p:cNvPr>
-          <p:cNvCxnSpPr>
-            <a:cxnSpLocks/>
-            <a:stCxn id="21" idx="2"/>
-            <a:endCxn id="6" idx="0"/>
-          </p:cNvCxnSpPr>
-          <p:nvPr/>
-        </p:nvCxnSpPr>
-        <p:spPr>
-          <a:xfrm rot="5400000">
-            <a:off x="1862969" y="2526474"/>
-            <a:ext cx="609371" cy="2522692"/>
-          </a:xfrm>
-          <a:prstGeom prst="bentConnector3">
-            <a:avLst>
-              <a:gd name="adj1" fmla="val 50000"/>
-            </a:avLst>
-          </a:prstGeom>
-          <a:ln w="63500">
-            <a:solidFill>
-              <a:schemeClr val="accent1">
-                <a:lumMod val="40000"/>
-                <a:lumOff val="60000"/>
-              </a:schemeClr>
-            </a:solidFill>
-          </a:ln>
-        </p:spPr>
-        <p:style>
-          <a:lnRef idx="3">
-            <a:schemeClr val="dk1"/>
-          </a:lnRef>
-          <a:fillRef idx="0">
-            <a:schemeClr val="dk1"/>
-          </a:fillRef>
-          <a:effectRef idx="2">
-            <a:schemeClr val="dk1"/>
-          </a:effectRef>
-          <a:fontRef idx="minor">
-            <a:schemeClr val="tx1"/>
-          </a:fontRef>
-        </p:style>
-      </p:cxnSp>
-    </p:spTree>
-    <p:extLst>
-      <p:ext uri="{BB962C8B-B14F-4D97-AF65-F5344CB8AC3E}">
-        <p14:creationId xmlns:p14="http://schemas.microsoft.com/office/powerpoint/2010/main" val="3306632355"/>
-      </p:ext>
-    </p:extLst>
-  </p:cSld>
-  <p:clrMapOvr>
-    <a:masterClrMapping/>
-  </p:clrMapOvr>
-</p:sld>
-</file>
-
 <file path=ppt/theme/theme1.xml><?xml version="1.0" encoding="utf-8"?>
 <a:theme xmlns:a="http://schemas.openxmlformats.org/drawingml/2006/main" name="Office 2013 - 2022 Theme">
   <a:themeElements>

</xml_diff>